<commit_message>
Update files for class
</commit_message>
<xml_diff>
--- a/1. Intro to R/presentations/3. R-Intro_part2.pptx
+++ b/1. Intro to R/presentations/3. R-Intro_part2.pptx
@@ -5,7 +5,7 @@
     <p:sldMasterId id="2147483660" r:id="rId1"/>
   </p:sldMasterIdLst>
   <p:notesMasterIdLst>
-    <p:notesMasterId r:id="rId21"/>
+    <p:notesMasterId r:id="rId26"/>
   </p:notesMasterIdLst>
   <p:sldIdLst>
     <p:sldId id="256" r:id="rId2"/>
@@ -27,6 +27,11 @@
     <p:sldId id="274" r:id="rId18"/>
     <p:sldId id="301" r:id="rId19"/>
     <p:sldId id="302" r:id="rId20"/>
+    <p:sldId id="303" r:id="rId21"/>
+    <p:sldId id="304" r:id="rId22"/>
+    <p:sldId id="305" r:id="rId23"/>
+    <p:sldId id="296" r:id="rId24"/>
+    <p:sldId id="260" r:id="rId25"/>
   </p:sldIdLst>
   <p:sldSz cx="9144000" cy="6858000" type="screen4x3"/>
   <p:notesSz cx="6858000" cy="9144000"/>
@@ -125,6 +130,11 @@
       </a:defRPr>
     </a:lvl9pPr>
   </p:defaultTextStyle>
+  <p:extLst>
+    <p:ext uri="{EFAFB233-063F-42B5-8137-9DF3F51BA10A}">
+      <p15:sldGuideLst xmlns:p15="http://schemas.microsoft.com/office/powerpoint/2012/main"/>
+    </p:ext>
+  </p:extLst>
 </p:presentation>
 </file>
 
@@ -210,7 +220,7 @@
           <a:p>
             <a:fld id="{24D835DA-F873-4441-A9ED-91E9C627787D}" type="datetimeFigureOut">
               <a:rPr lang="en-US" smtClean="0"/>
-              <a:t>9/10/19</a:t>
+              <a:t>8/25/21</a:t>
             </a:fld>
             <a:endParaRPr lang="en-US"/>
           </a:p>
@@ -561,6 +571,209 @@
 </p:notes>
 </file>
 
+<file path=ppt/notesSlides/notesSlide2.xml><?xml version="1.0" encoding="utf-8"?>
+<p:notes xmlns:a="http://schemas.openxmlformats.org/drawingml/2006/main" xmlns:r="http://schemas.openxmlformats.org/officeDocument/2006/relationships" xmlns:p="http://schemas.openxmlformats.org/presentationml/2006/main">
+  <p:cSld>
+    <p:spTree>
+      <p:nvGrpSpPr>
+        <p:cNvPr id="1" name=""/>
+        <p:cNvGrpSpPr/>
+        <p:nvPr/>
+      </p:nvGrpSpPr>
+      <p:grpSpPr>
+        <a:xfrm>
+          <a:off x="0" y="0"/>
+          <a:ext cx="0" cy="0"/>
+          <a:chOff x="0" y="0"/>
+          <a:chExt cx="0" cy="0"/>
+        </a:xfrm>
+      </p:grpSpPr>
+      <p:sp>
+        <p:nvSpPr>
+          <p:cNvPr id="2" name="Slide Image Placeholder 1"/>
+          <p:cNvSpPr>
+            <a:spLocks noGrp="1" noRot="1" noChangeAspect="1"/>
+          </p:cNvSpPr>
+          <p:nvPr>
+            <p:ph type="sldImg"/>
+          </p:nvPr>
+        </p:nvSpPr>
+        <p:spPr/>
+      </p:sp>
+      <p:sp>
+        <p:nvSpPr>
+          <p:cNvPr id="3" name="Notes Placeholder 2"/>
+          <p:cNvSpPr>
+            <a:spLocks noGrp="1"/>
+          </p:cNvSpPr>
+          <p:nvPr>
+            <p:ph type="body" idx="1"/>
+          </p:nvPr>
+        </p:nvSpPr>
+        <p:spPr/>
+        <p:txBody>
+          <a:bodyPr>
+            <a:normAutofit/>
+          </a:bodyPr>
+          <a:lstStyle/>
+          <a:p>
+            <a:r>
+              <a:rPr lang="en-US" dirty="0"/>
+              <a:t>Header=T means first row contains variable names</a:t>
+            </a:r>
+          </a:p>
+        </p:txBody>
+      </p:sp>
+      <p:sp>
+        <p:nvSpPr>
+          <p:cNvPr id="4" name="Slide Number Placeholder 3"/>
+          <p:cNvSpPr>
+            <a:spLocks noGrp="1"/>
+          </p:cNvSpPr>
+          <p:nvPr>
+            <p:ph type="sldNum" sz="quarter" idx="10"/>
+          </p:nvPr>
+        </p:nvSpPr>
+        <p:spPr/>
+        <p:txBody>
+          <a:bodyPr/>
+          <a:lstStyle/>
+          <a:p>
+            <a:fld id="{C95BFFDA-D938-4C0F-A2A8-5BB6B5B11556}" type="slidenum">
+              <a:rPr lang="en-US" smtClean="0"/>
+              <a:pPr/>
+              <a:t>22</a:t>
+            </a:fld>
+            <a:endParaRPr lang="en-US"/>
+          </a:p>
+        </p:txBody>
+      </p:sp>
+    </p:spTree>
+    <p:extLst>
+      <p:ext uri="{BB962C8B-B14F-4D97-AF65-F5344CB8AC3E}">
+        <p14:creationId xmlns:p14="http://schemas.microsoft.com/office/powerpoint/2010/main" val="2651360747"/>
+      </p:ext>
+    </p:extLst>
+  </p:cSld>
+  <p:clrMapOvr>
+    <a:masterClrMapping/>
+  </p:clrMapOvr>
+</p:notes>
+</file>
+
+<file path=ppt/notesSlides/notesSlide3.xml><?xml version="1.0" encoding="utf-8"?>
+<p:notes xmlns:a="http://schemas.openxmlformats.org/drawingml/2006/main" xmlns:r="http://schemas.openxmlformats.org/officeDocument/2006/relationships" xmlns:p="http://schemas.openxmlformats.org/presentationml/2006/main">
+  <p:cSld>
+    <p:spTree>
+      <p:nvGrpSpPr>
+        <p:cNvPr id="1" name=""/>
+        <p:cNvGrpSpPr/>
+        <p:nvPr/>
+      </p:nvGrpSpPr>
+      <p:grpSpPr>
+        <a:xfrm>
+          <a:off x="0" y="0"/>
+          <a:ext cx="0" cy="0"/>
+          <a:chOff x="0" y="0"/>
+          <a:chExt cx="0" cy="0"/>
+        </a:xfrm>
+      </p:grpSpPr>
+      <p:sp>
+        <p:nvSpPr>
+          <p:cNvPr id="2" name="Slide Image Placeholder 1"/>
+          <p:cNvSpPr>
+            <a:spLocks noGrp="1" noRot="1" noChangeAspect="1"/>
+          </p:cNvSpPr>
+          <p:nvPr>
+            <p:ph type="sldImg"/>
+          </p:nvPr>
+        </p:nvSpPr>
+        <p:spPr/>
+      </p:sp>
+      <p:sp>
+        <p:nvSpPr>
+          <p:cNvPr id="3" name="Notes Placeholder 2"/>
+          <p:cNvSpPr>
+            <a:spLocks noGrp="1"/>
+          </p:cNvSpPr>
+          <p:nvPr>
+            <p:ph type="body" idx="1"/>
+          </p:nvPr>
+        </p:nvSpPr>
+        <p:spPr/>
+        <p:txBody>
+          <a:bodyPr>
+            <a:normAutofit/>
+          </a:bodyPr>
+          <a:lstStyle/>
+          <a:p>
+            <a:r>
+              <a:rPr lang="en-US" dirty="0"/>
+              <a:t>Some numbers are actually factors-</a:t>
+            </a:r>
+            <a:r>
+              <a:rPr lang="en-US" baseline="0" dirty="0"/>
+              <a:t> think of 0/1 for dead/alive or </a:t>
+            </a:r>
+            <a:r>
+              <a:rPr lang="en-US" baseline="0" dirty="0" err="1"/>
+              <a:t>zipcodes</a:t>
+            </a:r>
+            <a:r>
+              <a:rPr lang="en-US" baseline="0" dirty="0"/>
+              <a:t> (average </a:t>
+            </a:r>
+            <a:r>
+              <a:rPr lang="en-US" baseline="0" dirty="0" err="1"/>
+              <a:t>zipcode</a:t>
+            </a:r>
+            <a:r>
+              <a:rPr lang="en-US" baseline="0" dirty="0"/>
+              <a:t>?)</a:t>
+            </a:r>
+          </a:p>
+          <a:p>
+            <a:endParaRPr lang="en-US" dirty="0"/>
+          </a:p>
+        </p:txBody>
+      </p:sp>
+      <p:sp>
+        <p:nvSpPr>
+          <p:cNvPr id="4" name="Slide Number Placeholder 3"/>
+          <p:cNvSpPr>
+            <a:spLocks noGrp="1"/>
+          </p:cNvSpPr>
+          <p:nvPr>
+            <p:ph type="sldNum" sz="quarter" idx="10"/>
+          </p:nvPr>
+        </p:nvSpPr>
+        <p:spPr/>
+        <p:txBody>
+          <a:bodyPr/>
+          <a:lstStyle/>
+          <a:p>
+            <a:fld id="{C95BFFDA-D938-4C0F-A2A8-5BB6B5B11556}" type="slidenum">
+              <a:rPr lang="en-US" smtClean="0"/>
+              <a:pPr/>
+              <a:t>24</a:t>
+            </a:fld>
+            <a:endParaRPr lang="en-US"/>
+          </a:p>
+        </p:txBody>
+      </p:sp>
+    </p:spTree>
+    <p:extLst>
+      <p:ext uri="{BB962C8B-B14F-4D97-AF65-F5344CB8AC3E}">
+        <p14:creationId xmlns:p14="http://schemas.microsoft.com/office/powerpoint/2010/main" val="940815122"/>
+      </p:ext>
+    </p:extLst>
+  </p:cSld>
+  <p:clrMapOvr>
+    <a:masterClrMapping/>
+  </p:clrMapOvr>
+</p:notes>
+</file>
+
 <file path=ppt/slideLayouts/slideLayout1.xml><?xml version="1.0" encoding="utf-8"?>
 <p:sldLayout xmlns:a="http://schemas.openxmlformats.org/drawingml/2006/main" xmlns:r="http://schemas.openxmlformats.org/officeDocument/2006/relationships" xmlns:p="http://schemas.openxmlformats.org/presentationml/2006/main" type="title" preserve="1">
   <p:cSld name="Title Slide">
@@ -692,7 +905,7 @@
           <a:p>
             <a:fld id="{D17AE834-0754-0944-8EF4-349530BA008F}" type="datetimeFigureOut">
               <a:rPr lang="en-US" smtClean="0"/>
-              <a:t>9/10/19</a:t>
+              <a:t>8/25/21</a:t>
             </a:fld>
             <a:endParaRPr lang="en-US"/>
           </a:p>
@@ -862,7 +1075,7 @@
           <a:p>
             <a:fld id="{D17AE834-0754-0944-8EF4-349530BA008F}" type="datetimeFigureOut">
               <a:rPr lang="en-US" smtClean="0"/>
-              <a:t>9/10/19</a:t>
+              <a:t>8/25/21</a:t>
             </a:fld>
             <a:endParaRPr lang="en-US"/>
           </a:p>
@@ -1042,7 +1255,7 @@
           <a:p>
             <a:fld id="{D17AE834-0754-0944-8EF4-349530BA008F}" type="datetimeFigureOut">
               <a:rPr lang="en-US" smtClean="0"/>
-              <a:t>9/10/19</a:t>
+              <a:t>8/25/21</a:t>
             </a:fld>
             <a:endParaRPr lang="en-US"/>
           </a:p>
@@ -1212,7 +1425,7 @@
           <a:p>
             <a:fld id="{D17AE834-0754-0944-8EF4-349530BA008F}" type="datetimeFigureOut">
               <a:rPr lang="en-US" smtClean="0"/>
-              <a:t>9/10/19</a:t>
+              <a:t>8/25/21</a:t>
             </a:fld>
             <a:endParaRPr lang="en-US"/>
           </a:p>
@@ -1456,7 +1669,7 @@
           <a:p>
             <a:fld id="{D17AE834-0754-0944-8EF4-349530BA008F}" type="datetimeFigureOut">
               <a:rPr lang="en-US" smtClean="0"/>
-              <a:t>9/10/19</a:t>
+              <a:t>8/25/21</a:t>
             </a:fld>
             <a:endParaRPr lang="en-US"/>
           </a:p>
@@ -1688,7 +1901,7 @@
           <a:p>
             <a:fld id="{D17AE834-0754-0944-8EF4-349530BA008F}" type="datetimeFigureOut">
               <a:rPr lang="en-US" smtClean="0"/>
-              <a:t>9/10/19</a:t>
+              <a:t>8/25/21</a:t>
             </a:fld>
             <a:endParaRPr lang="en-US"/>
           </a:p>
@@ -2055,7 +2268,7 @@
           <a:p>
             <a:fld id="{D17AE834-0754-0944-8EF4-349530BA008F}" type="datetimeFigureOut">
               <a:rPr lang="en-US" smtClean="0"/>
-              <a:t>9/10/19</a:t>
+              <a:t>8/25/21</a:t>
             </a:fld>
             <a:endParaRPr lang="en-US"/>
           </a:p>
@@ -2173,7 +2386,7 @@
           <a:p>
             <a:fld id="{D17AE834-0754-0944-8EF4-349530BA008F}" type="datetimeFigureOut">
               <a:rPr lang="en-US" smtClean="0"/>
-              <a:t>9/10/19</a:t>
+              <a:t>8/25/21</a:t>
             </a:fld>
             <a:endParaRPr lang="en-US"/>
           </a:p>
@@ -2268,7 +2481,7 @@
           <a:p>
             <a:fld id="{D17AE834-0754-0944-8EF4-349530BA008F}" type="datetimeFigureOut">
               <a:rPr lang="en-US" smtClean="0"/>
-              <a:t>9/10/19</a:t>
+              <a:t>8/25/21</a:t>
             </a:fld>
             <a:endParaRPr lang="en-US"/>
           </a:p>
@@ -2545,7 +2758,7 @@
           <a:p>
             <a:fld id="{D17AE834-0754-0944-8EF4-349530BA008F}" type="datetimeFigureOut">
               <a:rPr lang="en-US" smtClean="0"/>
-              <a:t>9/10/19</a:t>
+              <a:t>8/25/21</a:t>
             </a:fld>
             <a:endParaRPr lang="en-US"/>
           </a:p>
@@ -2802,7 +3015,7 @@
           <a:p>
             <a:fld id="{D17AE834-0754-0944-8EF4-349530BA008F}" type="datetimeFigureOut">
               <a:rPr lang="en-US" smtClean="0"/>
-              <a:t>9/10/19</a:t>
+              <a:t>8/25/21</a:t>
             </a:fld>
             <a:endParaRPr lang="en-US"/>
           </a:p>
@@ -3015,7 +3228,7 @@
           <a:p>
             <a:fld id="{D17AE834-0754-0944-8EF4-349530BA008F}" type="datetimeFigureOut">
               <a:rPr lang="en-US" smtClean="0"/>
-              <a:t>9/10/19</a:t>
+              <a:t>8/25/21</a:t>
             </a:fld>
             <a:endParaRPr lang="en-US"/>
           </a:p>
@@ -3483,7 +3696,7 @@
           <a:p>
             <a:r>
               <a:rPr lang="en-US" dirty="0"/>
-              <a:t>Fall 2019</a:t>
+              <a:t>Fall 2021</a:t>
             </a:r>
           </a:p>
         </p:txBody>
@@ -5124,6 +5337,1377 @@
   <p:clrMapOvr>
     <a:masterClrMapping/>
   </p:clrMapOvr>
+</p:sld>
+</file>
+
+<file path=ppt/slides/slide20.xml><?xml version="1.0" encoding="utf-8"?>
+<p:sld xmlns:a="http://schemas.openxmlformats.org/drawingml/2006/main" xmlns:r="http://schemas.openxmlformats.org/officeDocument/2006/relationships" xmlns:p="http://schemas.openxmlformats.org/presentationml/2006/main">
+  <p:cSld>
+    <p:spTree>
+      <p:nvGrpSpPr>
+        <p:cNvPr id="1" name=""/>
+        <p:cNvGrpSpPr/>
+        <p:nvPr/>
+      </p:nvGrpSpPr>
+      <p:grpSpPr>
+        <a:xfrm>
+          <a:off x="0" y="0"/>
+          <a:ext cx="0" cy="0"/>
+          <a:chOff x="0" y="0"/>
+          <a:chExt cx="0" cy="0"/>
+        </a:xfrm>
+      </p:grpSpPr>
+      <p:sp>
+        <p:nvSpPr>
+          <p:cNvPr id="2" name="Title 1">
+            <a:extLst>
+              <a:ext uri="{FF2B5EF4-FFF2-40B4-BE49-F238E27FC236}">
+                <a16:creationId xmlns:a16="http://schemas.microsoft.com/office/drawing/2014/main" id="{12E18977-9083-6F43-B6C5-4C70B958E7BC}"/>
+              </a:ext>
+            </a:extLst>
+          </p:cNvPr>
+          <p:cNvSpPr>
+            <a:spLocks noGrp="1"/>
+          </p:cNvSpPr>
+          <p:nvPr>
+            <p:ph type="title"/>
+          </p:nvPr>
+        </p:nvSpPr>
+        <p:spPr/>
+        <p:txBody>
+          <a:bodyPr/>
+          <a:lstStyle/>
+          <a:p>
+            <a:endParaRPr lang="en-US"/>
+          </a:p>
+        </p:txBody>
+      </p:sp>
+      <p:sp>
+        <p:nvSpPr>
+          <p:cNvPr id="3" name="Content Placeholder 2">
+            <a:extLst>
+              <a:ext uri="{FF2B5EF4-FFF2-40B4-BE49-F238E27FC236}">
+                <a16:creationId xmlns:a16="http://schemas.microsoft.com/office/drawing/2014/main" id="{D3E51221-3EE7-7344-AE4F-D23806F8F69A}"/>
+              </a:ext>
+            </a:extLst>
+          </p:cNvPr>
+          <p:cNvSpPr>
+            <a:spLocks noGrp="1"/>
+          </p:cNvSpPr>
+          <p:nvPr>
+            <p:ph idx="1"/>
+          </p:nvPr>
+        </p:nvSpPr>
+        <p:spPr/>
+        <p:txBody>
+          <a:bodyPr/>
+          <a:lstStyle/>
+          <a:p>
+            <a:endParaRPr lang="en-US"/>
+          </a:p>
+        </p:txBody>
+      </p:sp>
+    </p:spTree>
+    <p:extLst>
+      <p:ext uri="{BB962C8B-B14F-4D97-AF65-F5344CB8AC3E}">
+        <p14:creationId xmlns:p14="http://schemas.microsoft.com/office/powerpoint/2010/main" val="2040361328"/>
+      </p:ext>
+    </p:extLst>
+  </p:cSld>
+  <p:clrMapOvr>
+    <a:masterClrMapping/>
+  </p:clrMapOvr>
+</p:sld>
+</file>
+
+<file path=ppt/slides/slide21.xml><?xml version="1.0" encoding="utf-8"?>
+<p:sld xmlns:a="http://schemas.openxmlformats.org/drawingml/2006/main" xmlns:r="http://schemas.openxmlformats.org/officeDocument/2006/relationships" xmlns:p="http://schemas.openxmlformats.org/presentationml/2006/main">
+  <p:cSld>
+    <p:spTree>
+      <p:nvGrpSpPr>
+        <p:cNvPr id="1" name=""/>
+        <p:cNvGrpSpPr/>
+        <p:nvPr/>
+      </p:nvGrpSpPr>
+      <p:grpSpPr>
+        <a:xfrm>
+          <a:off x="0" y="0"/>
+          <a:ext cx="0" cy="0"/>
+          <a:chOff x="0" y="0"/>
+          <a:chExt cx="0" cy="0"/>
+        </a:xfrm>
+      </p:grpSpPr>
+      <p:sp>
+        <p:nvSpPr>
+          <p:cNvPr id="2" name="Title 1">
+            <a:extLst>
+              <a:ext uri="{FF2B5EF4-FFF2-40B4-BE49-F238E27FC236}">
+                <a16:creationId xmlns:a16="http://schemas.microsoft.com/office/drawing/2014/main" id="{40684D42-A734-D145-8884-D714A8E6D338}"/>
+              </a:ext>
+            </a:extLst>
+          </p:cNvPr>
+          <p:cNvSpPr>
+            <a:spLocks noGrp="1"/>
+          </p:cNvSpPr>
+          <p:nvPr>
+            <p:ph type="title"/>
+          </p:nvPr>
+        </p:nvSpPr>
+        <p:spPr/>
+        <p:txBody>
+          <a:bodyPr/>
+          <a:lstStyle/>
+          <a:p>
+            <a:endParaRPr lang="en-US"/>
+          </a:p>
+        </p:txBody>
+      </p:sp>
+      <p:sp>
+        <p:nvSpPr>
+          <p:cNvPr id="3" name="Content Placeholder 2">
+            <a:extLst>
+              <a:ext uri="{FF2B5EF4-FFF2-40B4-BE49-F238E27FC236}">
+                <a16:creationId xmlns:a16="http://schemas.microsoft.com/office/drawing/2014/main" id="{B6696726-045F-7844-89E0-EC72DA3E1E35}"/>
+              </a:ext>
+            </a:extLst>
+          </p:cNvPr>
+          <p:cNvSpPr>
+            <a:spLocks noGrp="1"/>
+          </p:cNvSpPr>
+          <p:nvPr>
+            <p:ph idx="1"/>
+          </p:nvPr>
+        </p:nvSpPr>
+        <p:spPr/>
+        <p:txBody>
+          <a:bodyPr/>
+          <a:lstStyle/>
+          <a:p>
+            <a:endParaRPr lang="en-US"/>
+          </a:p>
+        </p:txBody>
+      </p:sp>
+    </p:spTree>
+    <p:extLst>
+      <p:ext uri="{BB962C8B-B14F-4D97-AF65-F5344CB8AC3E}">
+        <p14:creationId xmlns:p14="http://schemas.microsoft.com/office/powerpoint/2010/main" val="992108563"/>
+      </p:ext>
+    </p:extLst>
+  </p:cSld>
+  <p:clrMapOvr>
+    <a:masterClrMapping/>
+  </p:clrMapOvr>
+</p:sld>
+</file>
+
+<file path=ppt/slides/slide22.xml><?xml version="1.0" encoding="utf-8"?>
+<p:sld xmlns:a="http://schemas.openxmlformats.org/drawingml/2006/main" xmlns:r="http://schemas.openxmlformats.org/officeDocument/2006/relationships" xmlns:p="http://schemas.openxmlformats.org/presentationml/2006/main">
+  <p:cSld>
+    <p:spTree>
+      <p:nvGrpSpPr>
+        <p:cNvPr id="1" name=""/>
+        <p:cNvGrpSpPr/>
+        <p:nvPr/>
+      </p:nvGrpSpPr>
+      <p:grpSpPr>
+        <a:xfrm>
+          <a:off x="0" y="0"/>
+          <a:ext cx="0" cy="0"/>
+          <a:chOff x="0" y="0"/>
+          <a:chExt cx="0" cy="0"/>
+        </a:xfrm>
+      </p:grpSpPr>
+      <p:sp>
+        <p:nvSpPr>
+          <p:cNvPr id="2" name="Title 1"/>
+          <p:cNvSpPr>
+            <a:spLocks noGrp="1"/>
+          </p:cNvSpPr>
+          <p:nvPr>
+            <p:ph type="title"/>
+          </p:nvPr>
+        </p:nvSpPr>
+        <p:spPr>
+          <a:xfrm>
+            <a:off x="457200" y="76200"/>
+            <a:ext cx="8229600" cy="868362"/>
+          </a:xfrm>
+        </p:spPr>
+        <p:txBody>
+          <a:bodyPr/>
+          <a:lstStyle/>
+          <a:p>
+            <a:r>
+              <a:rPr lang="en-US" dirty="0"/>
+              <a:t>Preparing your data for R</a:t>
+            </a:r>
+          </a:p>
+        </p:txBody>
+      </p:sp>
+      <p:sp>
+        <p:nvSpPr>
+          <p:cNvPr id="3" name="Content Placeholder 2"/>
+          <p:cNvSpPr>
+            <a:spLocks noGrp="1"/>
+          </p:cNvSpPr>
+          <p:nvPr>
+            <p:ph idx="1"/>
+          </p:nvPr>
+        </p:nvSpPr>
+        <p:spPr>
+          <a:xfrm>
+            <a:off x="457200" y="1143000"/>
+            <a:ext cx="8229600" cy="5410200"/>
+          </a:xfrm>
+        </p:spPr>
+        <p:txBody>
+          <a:bodyPr>
+            <a:noAutofit/>
+          </a:bodyPr>
+          <a:lstStyle/>
+          <a:p>
+            <a:r>
+              <a:rPr lang="en-US" sz="2400" dirty="0"/>
+              <a:t>Data should be in csv or Excel format</a:t>
+            </a:r>
+          </a:p>
+          <a:p>
+            <a:pPr lvl="1"/>
+            <a:r>
+              <a:rPr lang="en-US" sz="2400" dirty="0"/>
+              <a:t>No special formatting, filters, comments etc.</a:t>
+            </a:r>
+          </a:p>
+          <a:p>
+            <a:r>
+              <a:rPr lang="en-US" sz="2400" dirty="0"/>
+              <a:t>Name your variables well </a:t>
+            </a:r>
+          </a:p>
+          <a:p>
+            <a:pPr lvl="1"/>
+            <a:r>
+              <a:rPr lang="en-US" sz="2400" dirty="0"/>
+              <a:t>self-explanatory, unique, lowercase, short-</a:t>
+            </a:r>
+            <a:r>
+              <a:rPr lang="en-US" sz="2400" dirty="0" err="1"/>
+              <a:t>ish</a:t>
+            </a:r>
+            <a:r>
+              <a:rPr lang="en-US" sz="2400" dirty="0"/>
+              <a:t>, one-word names starting with letters (not #’s) are best</a:t>
+            </a:r>
+          </a:p>
+          <a:p>
+            <a:r>
+              <a:rPr lang="en-US" sz="2400" dirty="0"/>
+              <a:t>Correct spelling</a:t>
+            </a:r>
+          </a:p>
+          <a:p>
+            <a:r>
+              <a:rPr lang="en-US" sz="2400" dirty="0"/>
+              <a:t>Identical capitalization (e.g. </a:t>
+            </a:r>
+            <a:r>
+              <a:rPr lang="en-US" sz="2400" dirty="0" err="1"/>
+              <a:t>Premna</a:t>
+            </a:r>
+            <a:r>
+              <a:rPr lang="en-US" sz="2400" dirty="0"/>
+              <a:t> vs </a:t>
+            </a:r>
+            <a:r>
+              <a:rPr lang="en-US" sz="2400" dirty="0" err="1"/>
+              <a:t>premna</a:t>
+            </a:r>
+            <a:r>
+              <a:rPr lang="en-US" sz="2400" dirty="0"/>
+              <a:t>)</a:t>
+            </a:r>
+          </a:p>
+          <a:p>
+            <a:r>
+              <a:rPr lang="en-US" sz="2400" dirty="0"/>
+              <a:t>If </a:t>
+            </a:r>
+            <a:r>
+              <a:rPr lang="en-US" sz="2400" dirty="0" err="1"/>
+              <a:t>trt</a:t>
+            </a:r>
+            <a:r>
+              <a:rPr lang="en-US" sz="2400" dirty="0"/>
+              <a:t> &lt;- c(3, 4, 5), calling </a:t>
+            </a:r>
+            <a:r>
+              <a:rPr lang="en-US" sz="2400" dirty="0" err="1"/>
+              <a:t>Trt</a:t>
+            </a:r>
+            <a:r>
+              <a:rPr lang="en-US" sz="2400" dirty="0"/>
+              <a:t> does not work!</a:t>
+            </a:r>
+          </a:p>
+          <a:p>
+            <a:r>
+              <a:rPr lang="en-US" sz="2400" dirty="0"/>
+              <a:t>No commas within cells if using csv</a:t>
+            </a:r>
+          </a:p>
+          <a:p>
+            <a:r>
+              <a:rPr lang="en-US" sz="2400" dirty="0"/>
+              <a:t>Use NA or blank for missing values</a:t>
+            </a:r>
+          </a:p>
+          <a:p>
+            <a:pPr lvl="1"/>
+            <a:endParaRPr lang="en-US" sz="2400" dirty="0"/>
+          </a:p>
+        </p:txBody>
+      </p:sp>
+    </p:spTree>
+    <p:extLst>
+      <p:ext uri="{BB962C8B-B14F-4D97-AF65-F5344CB8AC3E}">
+        <p14:creationId xmlns:p14="http://schemas.microsoft.com/office/powerpoint/2010/main" val="664548069"/>
+      </p:ext>
+    </p:extLst>
+  </p:cSld>
+  <p:clrMapOvr>
+    <a:masterClrMapping/>
+  </p:clrMapOvr>
+</p:sld>
+</file>
+
+<file path=ppt/slides/slide23.xml><?xml version="1.0" encoding="utf-8"?>
+<p:sld xmlns:a="http://schemas.openxmlformats.org/drawingml/2006/main" xmlns:r="http://schemas.openxmlformats.org/officeDocument/2006/relationships" xmlns:p="http://schemas.openxmlformats.org/presentationml/2006/main">
+  <p:cSld>
+    <p:spTree>
+      <p:nvGrpSpPr>
+        <p:cNvPr id="1" name=""/>
+        <p:cNvGrpSpPr/>
+        <p:nvPr/>
+      </p:nvGrpSpPr>
+      <p:grpSpPr>
+        <a:xfrm>
+          <a:off x="0" y="0"/>
+          <a:ext cx="0" cy="0"/>
+          <a:chOff x="0" y="0"/>
+          <a:chExt cx="0" cy="0"/>
+        </a:xfrm>
+      </p:grpSpPr>
+      <p:sp>
+        <p:nvSpPr>
+          <p:cNvPr id="2" name="Title 1">
+            <a:extLst>
+              <a:ext uri="{FF2B5EF4-FFF2-40B4-BE49-F238E27FC236}">
+                <a16:creationId xmlns:a16="http://schemas.microsoft.com/office/drawing/2014/main" id="{32C395B9-E34E-144D-9463-8060E0DAC030}"/>
+              </a:ext>
+            </a:extLst>
+          </p:cNvPr>
+          <p:cNvSpPr>
+            <a:spLocks noGrp="1"/>
+          </p:cNvSpPr>
+          <p:nvPr>
+            <p:ph type="title"/>
+          </p:nvPr>
+        </p:nvSpPr>
+        <p:spPr/>
+        <p:txBody>
+          <a:bodyPr/>
+          <a:lstStyle/>
+          <a:p>
+            <a:r>
+              <a:rPr lang="en-US" dirty="0"/>
+              <a:t>Read in Data</a:t>
+            </a:r>
+          </a:p>
+        </p:txBody>
+      </p:sp>
+      <p:sp>
+        <p:nvSpPr>
+          <p:cNvPr id="3" name="Content Placeholder 2">
+            <a:extLst>
+              <a:ext uri="{FF2B5EF4-FFF2-40B4-BE49-F238E27FC236}">
+                <a16:creationId xmlns:a16="http://schemas.microsoft.com/office/drawing/2014/main" id="{302883FE-A885-C749-8E9E-115D59D65EF1}"/>
+              </a:ext>
+            </a:extLst>
+          </p:cNvPr>
+          <p:cNvSpPr>
+            <a:spLocks noGrp="1"/>
+          </p:cNvSpPr>
+          <p:nvPr>
+            <p:ph idx="1"/>
+          </p:nvPr>
+        </p:nvSpPr>
+        <p:spPr>
+          <a:xfrm>
+            <a:off x="457200" y="1380852"/>
+            <a:ext cx="8229600" cy="4983162"/>
+          </a:xfrm>
+        </p:spPr>
+        <p:txBody>
+          <a:bodyPr>
+            <a:normAutofit lnSpcReduction="10000"/>
+          </a:bodyPr>
+          <a:lstStyle/>
+          <a:p>
+            <a:r>
+              <a:rPr lang="en-US" sz="2400" dirty="0"/>
+              <a:t>Read in data</a:t>
+            </a:r>
+          </a:p>
+          <a:p>
+            <a:pPr lvl="1"/>
+            <a:r>
+              <a:rPr lang="en-US" sz="2400" dirty="0"/>
+              <a:t>CSV files: </a:t>
+            </a:r>
+          </a:p>
+          <a:p>
+            <a:pPr lvl="2"/>
+            <a:r>
+              <a:rPr lang="en-US" sz="2000" dirty="0" err="1"/>
+              <a:t>iris.df</a:t>
+            </a:r>
+            <a:r>
+              <a:rPr lang="en-US" sz="2000" dirty="0"/>
+              <a:t> &lt;- </a:t>
+            </a:r>
+            <a:r>
+              <a:rPr lang="en-US" sz="2000" dirty="0" err="1"/>
+              <a:t>read.csv</a:t>
+            </a:r>
+            <a:r>
+              <a:rPr lang="en-US" sz="2000" dirty="0"/>
+              <a:t>("</a:t>
+            </a:r>
+            <a:r>
+              <a:rPr lang="en-US" sz="2000" dirty="0" err="1"/>
+              <a:t>iris_df.csv</a:t>
+            </a:r>
+            <a:r>
+              <a:rPr lang="en-US" sz="2000" dirty="0"/>
+              <a:t>", header=T)</a:t>
+            </a:r>
+          </a:p>
+          <a:p>
+            <a:pPr lvl="2"/>
+            <a:r>
+              <a:rPr lang="en-US" sz="2000" dirty="0" err="1"/>
+              <a:t>Readr</a:t>
+            </a:r>
+            <a:r>
+              <a:rPr lang="en-US" sz="2000" dirty="0"/>
+              <a:t> package: </a:t>
+            </a:r>
+            <a:r>
+              <a:rPr lang="en-US" sz="2000" dirty="0" err="1"/>
+              <a:t>iris.df</a:t>
+            </a:r>
+            <a:r>
+              <a:rPr lang="en-US" sz="2000" dirty="0"/>
+              <a:t> &lt;- </a:t>
+            </a:r>
+            <a:r>
+              <a:rPr lang="en-US" sz="2000" dirty="0" err="1"/>
+              <a:t>read_csv</a:t>
+            </a:r>
+            <a:r>
+              <a:rPr lang="en-US" sz="2000" dirty="0"/>
+              <a:t>(“</a:t>
+            </a:r>
+            <a:r>
+              <a:rPr lang="en-US" sz="2000" dirty="0" err="1"/>
+              <a:t>iris_df.csv</a:t>
+            </a:r>
+            <a:r>
+              <a:rPr lang="en-US" sz="2000" dirty="0"/>
+              <a:t>”)</a:t>
+            </a:r>
+          </a:p>
+          <a:p>
+            <a:pPr lvl="1"/>
+            <a:r>
+              <a:rPr lang="en-US" sz="2400" dirty="0"/>
+              <a:t>Excel files: </a:t>
+            </a:r>
+          </a:p>
+          <a:p>
+            <a:pPr lvl="2"/>
+            <a:r>
+              <a:rPr lang="en-US" sz="2000" dirty="0"/>
+              <a:t>Use </a:t>
+            </a:r>
+            <a:r>
+              <a:rPr lang="en-US" sz="2000" dirty="0" err="1"/>
+              <a:t>readxl</a:t>
+            </a:r>
+            <a:r>
+              <a:rPr lang="en-US" sz="2000" dirty="0"/>
+              <a:t>() function. Part of </a:t>
+            </a:r>
+            <a:r>
+              <a:rPr lang="en-US" sz="2000" dirty="0" err="1"/>
+              <a:t>tidyverse</a:t>
+            </a:r>
+            <a:r>
+              <a:rPr lang="en-US" sz="2000" dirty="0"/>
+              <a:t>. </a:t>
+            </a:r>
+          </a:p>
+          <a:p>
+            <a:pPr lvl="3"/>
+            <a:r>
+              <a:rPr lang="en-US" sz="1600" dirty="0" err="1"/>
+              <a:t>read_excel</a:t>
+            </a:r>
+            <a:r>
+              <a:rPr lang="en-US" sz="1600" dirty="0"/>
+              <a:t>() reads both </a:t>
+            </a:r>
+            <a:r>
+              <a:rPr lang="en-US" sz="1600" dirty="0" err="1"/>
+              <a:t>xls</a:t>
+            </a:r>
+            <a:r>
+              <a:rPr lang="en-US" sz="1600" dirty="0"/>
+              <a:t> and xlsx files</a:t>
+            </a:r>
+          </a:p>
+          <a:p>
+            <a:pPr lvl="3"/>
+            <a:r>
+              <a:rPr lang="en-US" sz="1600" dirty="0" err="1"/>
+              <a:t>read_excel</a:t>
+            </a:r>
+            <a:r>
+              <a:rPr lang="en-US" sz="1600" dirty="0"/>
+              <a:t>(“</a:t>
+            </a:r>
+            <a:r>
+              <a:rPr lang="en-US" sz="1600" dirty="0" err="1"/>
+              <a:t>dataset.xlsx</a:t>
+            </a:r>
+            <a:r>
+              <a:rPr lang="en-US" sz="1600" dirty="0"/>
+              <a:t>”, sheet = 2, </a:t>
+            </a:r>
+            <a:r>
+              <a:rPr lang="en-US" sz="1600" dirty="0" err="1"/>
+              <a:t>col_names</a:t>
+            </a:r>
+            <a:r>
+              <a:rPr lang="en-US" sz="1600" dirty="0"/>
+              <a:t>=c(“a”, “b”))</a:t>
+            </a:r>
+          </a:p>
+          <a:p>
+            <a:pPr lvl="2"/>
+            <a:r>
+              <a:rPr lang="en-US" sz="2000" dirty="0"/>
+              <a:t>Other options include ‘xlsx’ and ‘</a:t>
+            </a:r>
+            <a:r>
+              <a:rPr lang="en-US" sz="2000" dirty="0" err="1"/>
+              <a:t>XLConnect</a:t>
+            </a:r>
+            <a:r>
+              <a:rPr lang="en-US" sz="2000" dirty="0"/>
+              <a:t>’ packages</a:t>
+            </a:r>
+          </a:p>
+          <a:p>
+            <a:r>
+              <a:rPr lang="en-US" sz="2800" dirty="0"/>
+              <a:t>R Studio Trick: </a:t>
+            </a:r>
+          </a:p>
+          <a:p>
+            <a:pPr lvl="1"/>
+            <a:r>
+              <a:rPr lang="en-US" sz="2400" dirty="0"/>
+              <a:t>use “import dataset” tool, or navigate to the location of your datafile and click on it and choose “import dataset”</a:t>
+            </a:r>
+          </a:p>
+          <a:p>
+            <a:pPr lvl="1"/>
+            <a:r>
+              <a:rPr lang="en-US" sz="2400" dirty="0"/>
+              <a:t>follow directions on the pop-up box</a:t>
+            </a:r>
+          </a:p>
+          <a:p>
+            <a:pPr lvl="1"/>
+            <a:r>
+              <a:rPr lang="en-US" sz="2400" dirty="0"/>
+              <a:t>copy the code that runs in your console into your script</a:t>
+            </a:r>
+          </a:p>
+          <a:p>
+            <a:endParaRPr lang="en-US" dirty="0"/>
+          </a:p>
+        </p:txBody>
+      </p:sp>
+    </p:spTree>
+    <p:extLst>
+      <p:ext uri="{BB962C8B-B14F-4D97-AF65-F5344CB8AC3E}">
+        <p14:creationId xmlns:p14="http://schemas.microsoft.com/office/powerpoint/2010/main" val="3700188996"/>
+      </p:ext>
+    </p:extLst>
+  </p:cSld>
+  <p:clrMapOvr>
+    <a:masterClrMapping/>
+  </p:clrMapOvr>
+</p:sld>
+</file>
+
+<file path=ppt/slides/slide24.xml><?xml version="1.0" encoding="utf-8"?>
+<p:sld xmlns:a="http://schemas.openxmlformats.org/drawingml/2006/main" xmlns:r="http://schemas.openxmlformats.org/officeDocument/2006/relationships" xmlns:p="http://schemas.openxmlformats.org/presentationml/2006/main">
+  <p:cSld>
+    <p:spTree>
+      <p:nvGrpSpPr>
+        <p:cNvPr id="1" name=""/>
+        <p:cNvGrpSpPr/>
+        <p:nvPr/>
+      </p:nvGrpSpPr>
+      <p:grpSpPr>
+        <a:xfrm>
+          <a:off x="0" y="0"/>
+          <a:ext cx="0" cy="0"/>
+          <a:chOff x="0" y="0"/>
+          <a:chExt cx="0" cy="0"/>
+        </a:xfrm>
+      </p:grpSpPr>
+      <p:sp>
+        <p:nvSpPr>
+          <p:cNvPr id="2" name="Title 1"/>
+          <p:cNvSpPr>
+            <a:spLocks noGrp="1"/>
+          </p:cNvSpPr>
+          <p:nvPr>
+            <p:ph type="title"/>
+          </p:nvPr>
+        </p:nvSpPr>
+        <p:spPr/>
+        <p:txBody>
+          <a:bodyPr/>
+          <a:lstStyle/>
+          <a:p>
+            <a:r>
+              <a:rPr lang="en-US" dirty="0"/>
+              <a:t>Exploring dataframes</a:t>
+            </a:r>
+          </a:p>
+        </p:txBody>
+      </p:sp>
+      <p:sp>
+        <p:nvSpPr>
+          <p:cNvPr id="3" name="Content Placeholder 2"/>
+          <p:cNvSpPr>
+            <a:spLocks noGrp="1"/>
+          </p:cNvSpPr>
+          <p:nvPr>
+            <p:ph idx="1"/>
+          </p:nvPr>
+        </p:nvSpPr>
+        <p:spPr>
+          <a:xfrm>
+            <a:off x="457200" y="1600200"/>
+            <a:ext cx="8229600" cy="4572000"/>
+          </a:xfrm>
+        </p:spPr>
+        <p:txBody>
+          <a:bodyPr>
+            <a:normAutofit fontScale="77500" lnSpcReduction="20000"/>
+          </a:bodyPr>
+          <a:lstStyle/>
+          <a:p>
+            <a:r>
+              <a:rPr lang="en-US" dirty="0"/>
+              <a:t>str(dataframe) -  column classes and dimensions</a:t>
+            </a:r>
+          </a:p>
+          <a:p>
+            <a:r>
+              <a:rPr lang="en-US" dirty="0"/>
+              <a:t>head(dataframe) and tail() - first and last 6 rows</a:t>
+            </a:r>
+          </a:p>
+          <a:p>
+            <a:r>
+              <a:rPr lang="en-US" dirty="0" err="1"/>
+              <a:t>names(dataframe</a:t>
+            </a:r>
+            <a:r>
+              <a:rPr lang="en-US" dirty="0"/>
+              <a:t>) - column names</a:t>
+            </a:r>
+          </a:p>
+          <a:p>
+            <a:r>
+              <a:rPr lang="en-US" dirty="0"/>
+              <a:t>row.names(dataframe) - row names</a:t>
+            </a:r>
+          </a:p>
+          <a:p>
+            <a:r>
+              <a:rPr lang="en-US" dirty="0"/>
+              <a:t>attributes(dataframe) - column and row names and object class</a:t>
+            </a:r>
+          </a:p>
+          <a:p>
+            <a:r>
+              <a:rPr lang="en-US" dirty="0" err="1"/>
+              <a:t>summary(dataframe</a:t>
+            </a:r>
+            <a:r>
+              <a:rPr lang="en-US" dirty="0"/>
+              <a:t>) – gives a lot of good information</a:t>
+            </a:r>
+          </a:p>
+          <a:p>
+            <a:pPr lvl="1"/>
+            <a:r>
+              <a:rPr lang="en-US" dirty="0"/>
+              <a:t>Make sure variables are appropriate class</a:t>
+            </a:r>
+          </a:p>
+          <a:p>
+            <a:pPr lvl="2"/>
+            <a:r>
+              <a:rPr lang="en-US" dirty="0"/>
+              <a:t>Character/string, Numeric, Factor, Integer, logical</a:t>
+            </a:r>
+          </a:p>
+          <a:p>
+            <a:pPr lvl="1"/>
+            <a:r>
+              <a:rPr lang="en-US" dirty="0"/>
+              <a:t>Make sure </a:t>
+            </a:r>
+            <a:r>
+              <a:rPr lang="en-US" dirty="0" err="1"/>
+              <a:t>mins</a:t>
+            </a:r>
+            <a:r>
+              <a:rPr lang="en-US" dirty="0"/>
+              <a:t>, </a:t>
+            </a:r>
+            <a:r>
+              <a:rPr lang="en-US" dirty="0" err="1"/>
+              <a:t>maxs</a:t>
+            </a:r>
+            <a:r>
+              <a:rPr lang="en-US" dirty="0"/>
+              <a:t>, means, etc. seem right</a:t>
+            </a:r>
+          </a:p>
+          <a:p>
+            <a:pPr lvl="1"/>
+            <a:r>
+              <a:rPr lang="en-US" dirty="0"/>
+              <a:t>Make sure you don’t have typing errors so Premna and </a:t>
+            </a:r>
+            <a:r>
+              <a:rPr lang="en-US" dirty="0" err="1"/>
+              <a:t>premna</a:t>
+            </a:r>
+            <a:r>
+              <a:rPr lang="en-US" dirty="0"/>
+              <a:t> are two separate factors</a:t>
+            </a:r>
+          </a:p>
+          <a:p>
+            <a:r>
+              <a:rPr lang="en-US" dirty="0"/>
+              <a:t>Use: unique(</a:t>
+            </a:r>
+            <a:r>
+              <a:rPr lang="en-US" dirty="0" err="1"/>
+              <a:t>spider$species</a:t>
+            </a:r>
+            <a:r>
+              <a:rPr lang="en-US" dirty="0"/>
+              <a:t>) to see what all unique values of a column are</a:t>
+            </a:r>
+          </a:p>
+          <a:p>
+            <a:r>
+              <a:rPr lang="en-US" dirty="0"/>
+              <a:t>Or use: levels(</a:t>
+            </a:r>
+            <a:r>
+              <a:rPr lang="en-US" dirty="0" err="1"/>
+              <a:t>spider$species</a:t>
+            </a:r>
+            <a:r>
+              <a:rPr lang="en-US" dirty="0"/>
+              <a:t>) to see different levels</a:t>
+            </a:r>
+          </a:p>
+        </p:txBody>
+      </p:sp>
+    </p:spTree>
+    <p:extLst>
+      <p:ext uri="{BB962C8B-B14F-4D97-AF65-F5344CB8AC3E}">
+        <p14:creationId xmlns:p14="http://schemas.microsoft.com/office/powerpoint/2010/main" val="3414467041"/>
+      </p:ext>
+    </p:extLst>
+  </p:cSld>
+  <p:clrMapOvr>
+    <a:masterClrMapping/>
+  </p:clrMapOvr>
+  <p:timing>
+    <p:tnLst>
+      <p:par>
+        <p:cTn id="1" dur="indefinite" restart="never" nodeType="tmRoot">
+          <p:childTnLst>
+            <p:seq concurrent="1" nextAc="seek">
+              <p:cTn id="2" dur="indefinite" nodeType="mainSeq">
+                <p:childTnLst>
+                  <p:par>
+                    <p:cTn id="3" fill="hold">
+                      <p:stCondLst>
+                        <p:cond delay="indefinite"/>
+                      </p:stCondLst>
+                      <p:childTnLst>
+                        <p:par>
+                          <p:cTn id="4" fill="hold">
+                            <p:stCondLst>
+                              <p:cond delay="0"/>
+                            </p:stCondLst>
+                            <p:childTnLst>
+                              <p:par>
+                                <p:cTn id="5" presetID="1" presetClass="entr" presetSubtype="0" fill="hold" grpId="0" nodeType="clickEffect">
+                                  <p:stCondLst>
+                                    <p:cond delay="0"/>
+                                  </p:stCondLst>
+                                  <p:childTnLst>
+                                    <p:set>
+                                      <p:cBhvr>
+                                        <p:cTn id="6" dur="1" fill="hold">
+                                          <p:stCondLst>
+                                            <p:cond delay="0"/>
+                                          </p:stCondLst>
+                                        </p:cTn>
+                                        <p:tgtEl>
+                                          <p:spTgt spid="3">
+                                            <p:txEl>
+                                              <p:pRg st="0" end="0"/>
+                                            </p:txEl>
+                                          </p:spTgt>
+                                        </p:tgtEl>
+                                        <p:attrNameLst>
+                                          <p:attrName>style.visibility</p:attrName>
+                                        </p:attrNameLst>
+                                      </p:cBhvr>
+                                      <p:to>
+                                        <p:strVal val="visible"/>
+                                      </p:to>
+                                    </p:set>
+                                  </p:childTnLst>
+                                </p:cTn>
+                              </p:par>
+                            </p:childTnLst>
+                          </p:cTn>
+                        </p:par>
+                      </p:childTnLst>
+                    </p:cTn>
+                  </p:par>
+                  <p:par>
+                    <p:cTn id="7" fill="hold">
+                      <p:stCondLst>
+                        <p:cond delay="indefinite"/>
+                      </p:stCondLst>
+                      <p:childTnLst>
+                        <p:par>
+                          <p:cTn id="8" fill="hold">
+                            <p:stCondLst>
+                              <p:cond delay="0"/>
+                            </p:stCondLst>
+                            <p:childTnLst>
+                              <p:par>
+                                <p:cTn id="9" presetID="1" presetClass="entr" presetSubtype="0" fill="hold" grpId="0" nodeType="clickEffect">
+                                  <p:stCondLst>
+                                    <p:cond delay="0"/>
+                                  </p:stCondLst>
+                                  <p:childTnLst>
+                                    <p:set>
+                                      <p:cBhvr>
+                                        <p:cTn id="10" dur="1" fill="hold">
+                                          <p:stCondLst>
+                                            <p:cond delay="0"/>
+                                          </p:stCondLst>
+                                        </p:cTn>
+                                        <p:tgtEl>
+                                          <p:spTgt spid="3">
+                                            <p:txEl>
+                                              <p:pRg st="1" end="1"/>
+                                            </p:txEl>
+                                          </p:spTgt>
+                                        </p:tgtEl>
+                                        <p:attrNameLst>
+                                          <p:attrName>style.visibility</p:attrName>
+                                        </p:attrNameLst>
+                                      </p:cBhvr>
+                                      <p:to>
+                                        <p:strVal val="visible"/>
+                                      </p:to>
+                                    </p:set>
+                                  </p:childTnLst>
+                                </p:cTn>
+                              </p:par>
+                            </p:childTnLst>
+                          </p:cTn>
+                        </p:par>
+                      </p:childTnLst>
+                    </p:cTn>
+                  </p:par>
+                  <p:par>
+                    <p:cTn id="11" fill="hold">
+                      <p:stCondLst>
+                        <p:cond delay="indefinite"/>
+                      </p:stCondLst>
+                      <p:childTnLst>
+                        <p:par>
+                          <p:cTn id="12" fill="hold">
+                            <p:stCondLst>
+                              <p:cond delay="0"/>
+                            </p:stCondLst>
+                            <p:childTnLst>
+                              <p:par>
+                                <p:cTn id="13" presetID="1" presetClass="entr" presetSubtype="0" fill="hold" grpId="0" nodeType="clickEffect">
+                                  <p:stCondLst>
+                                    <p:cond delay="0"/>
+                                  </p:stCondLst>
+                                  <p:childTnLst>
+                                    <p:set>
+                                      <p:cBhvr>
+                                        <p:cTn id="14" dur="1" fill="hold">
+                                          <p:stCondLst>
+                                            <p:cond delay="0"/>
+                                          </p:stCondLst>
+                                        </p:cTn>
+                                        <p:tgtEl>
+                                          <p:spTgt spid="3">
+                                            <p:txEl>
+                                              <p:pRg st="2" end="2"/>
+                                            </p:txEl>
+                                          </p:spTgt>
+                                        </p:tgtEl>
+                                        <p:attrNameLst>
+                                          <p:attrName>style.visibility</p:attrName>
+                                        </p:attrNameLst>
+                                      </p:cBhvr>
+                                      <p:to>
+                                        <p:strVal val="visible"/>
+                                      </p:to>
+                                    </p:set>
+                                  </p:childTnLst>
+                                </p:cTn>
+                              </p:par>
+                            </p:childTnLst>
+                          </p:cTn>
+                        </p:par>
+                      </p:childTnLst>
+                    </p:cTn>
+                  </p:par>
+                  <p:par>
+                    <p:cTn id="15" fill="hold">
+                      <p:stCondLst>
+                        <p:cond delay="indefinite"/>
+                      </p:stCondLst>
+                      <p:childTnLst>
+                        <p:par>
+                          <p:cTn id="16" fill="hold">
+                            <p:stCondLst>
+                              <p:cond delay="0"/>
+                            </p:stCondLst>
+                            <p:childTnLst>
+                              <p:par>
+                                <p:cTn id="17" presetID="1" presetClass="entr" presetSubtype="0" fill="hold" grpId="0" nodeType="clickEffect">
+                                  <p:stCondLst>
+                                    <p:cond delay="0"/>
+                                  </p:stCondLst>
+                                  <p:childTnLst>
+                                    <p:set>
+                                      <p:cBhvr>
+                                        <p:cTn id="18" dur="1" fill="hold">
+                                          <p:stCondLst>
+                                            <p:cond delay="0"/>
+                                          </p:stCondLst>
+                                        </p:cTn>
+                                        <p:tgtEl>
+                                          <p:spTgt spid="3">
+                                            <p:txEl>
+                                              <p:pRg st="3" end="3"/>
+                                            </p:txEl>
+                                          </p:spTgt>
+                                        </p:tgtEl>
+                                        <p:attrNameLst>
+                                          <p:attrName>style.visibility</p:attrName>
+                                        </p:attrNameLst>
+                                      </p:cBhvr>
+                                      <p:to>
+                                        <p:strVal val="visible"/>
+                                      </p:to>
+                                    </p:set>
+                                  </p:childTnLst>
+                                </p:cTn>
+                              </p:par>
+                            </p:childTnLst>
+                          </p:cTn>
+                        </p:par>
+                      </p:childTnLst>
+                    </p:cTn>
+                  </p:par>
+                  <p:par>
+                    <p:cTn id="19" fill="hold">
+                      <p:stCondLst>
+                        <p:cond delay="indefinite"/>
+                      </p:stCondLst>
+                      <p:childTnLst>
+                        <p:par>
+                          <p:cTn id="20" fill="hold">
+                            <p:stCondLst>
+                              <p:cond delay="0"/>
+                            </p:stCondLst>
+                            <p:childTnLst>
+                              <p:par>
+                                <p:cTn id="21" presetID="1" presetClass="entr" presetSubtype="0" fill="hold" grpId="0" nodeType="clickEffect">
+                                  <p:stCondLst>
+                                    <p:cond delay="0"/>
+                                  </p:stCondLst>
+                                  <p:childTnLst>
+                                    <p:set>
+                                      <p:cBhvr>
+                                        <p:cTn id="22" dur="1" fill="hold">
+                                          <p:stCondLst>
+                                            <p:cond delay="0"/>
+                                          </p:stCondLst>
+                                        </p:cTn>
+                                        <p:tgtEl>
+                                          <p:spTgt spid="3">
+                                            <p:txEl>
+                                              <p:pRg st="4" end="4"/>
+                                            </p:txEl>
+                                          </p:spTgt>
+                                        </p:tgtEl>
+                                        <p:attrNameLst>
+                                          <p:attrName>style.visibility</p:attrName>
+                                        </p:attrNameLst>
+                                      </p:cBhvr>
+                                      <p:to>
+                                        <p:strVal val="visible"/>
+                                      </p:to>
+                                    </p:set>
+                                  </p:childTnLst>
+                                </p:cTn>
+                              </p:par>
+                            </p:childTnLst>
+                          </p:cTn>
+                        </p:par>
+                      </p:childTnLst>
+                    </p:cTn>
+                  </p:par>
+                  <p:par>
+                    <p:cTn id="23" fill="hold">
+                      <p:stCondLst>
+                        <p:cond delay="indefinite"/>
+                      </p:stCondLst>
+                      <p:childTnLst>
+                        <p:par>
+                          <p:cTn id="24" fill="hold">
+                            <p:stCondLst>
+                              <p:cond delay="0"/>
+                            </p:stCondLst>
+                            <p:childTnLst>
+                              <p:par>
+                                <p:cTn id="25" presetID="1" presetClass="entr" presetSubtype="0" fill="hold" grpId="0" nodeType="clickEffect">
+                                  <p:stCondLst>
+                                    <p:cond delay="0"/>
+                                  </p:stCondLst>
+                                  <p:childTnLst>
+                                    <p:set>
+                                      <p:cBhvr>
+                                        <p:cTn id="26" dur="1" fill="hold">
+                                          <p:stCondLst>
+                                            <p:cond delay="0"/>
+                                          </p:stCondLst>
+                                        </p:cTn>
+                                        <p:tgtEl>
+                                          <p:spTgt spid="3">
+                                            <p:txEl>
+                                              <p:pRg st="5" end="5"/>
+                                            </p:txEl>
+                                          </p:spTgt>
+                                        </p:tgtEl>
+                                        <p:attrNameLst>
+                                          <p:attrName>style.visibility</p:attrName>
+                                        </p:attrNameLst>
+                                      </p:cBhvr>
+                                      <p:to>
+                                        <p:strVal val="visible"/>
+                                      </p:to>
+                                    </p:set>
+                                  </p:childTnLst>
+                                </p:cTn>
+                              </p:par>
+                              <p:par>
+                                <p:cTn id="27" presetID="1" presetClass="entr" presetSubtype="0" fill="hold" grpId="0" nodeType="withEffect">
+                                  <p:stCondLst>
+                                    <p:cond delay="0"/>
+                                  </p:stCondLst>
+                                  <p:childTnLst>
+                                    <p:set>
+                                      <p:cBhvr>
+                                        <p:cTn id="28" dur="1" fill="hold">
+                                          <p:stCondLst>
+                                            <p:cond delay="0"/>
+                                          </p:stCondLst>
+                                        </p:cTn>
+                                        <p:tgtEl>
+                                          <p:spTgt spid="3">
+                                            <p:txEl>
+                                              <p:pRg st="6" end="6"/>
+                                            </p:txEl>
+                                          </p:spTgt>
+                                        </p:tgtEl>
+                                        <p:attrNameLst>
+                                          <p:attrName>style.visibility</p:attrName>
+                                        </p:attrNameLst>
+                                      </p:cBhvr>
+                                      <p:to>
+                                        <p:strVal val="visible"/>
+                                      </p:to>
+                                    </p:set>
+                                  </p:childTnLst>
+                                </p:cTn>
+                              </p:par>
+                              <p:par>
+                                <p:cTn id="29" presetID="1" presetClass="entr" presetSubtype="0" fill="hold" grpId="0" nodeType="withEffect">
+                                  <p:stCondLst>
+                                    <p:cond delay="0"/>
+                                  </p:stCondLst>
+                                  <p:childTnLst>
+                                    <p:set>
+                                      <p:cBhvr>
+                                        <p:cTn id="30" dur="1" fill="hold">
+                                          <p:stCondLst>
+                                            <p:cond delay="0"/>
+                                          </p:stCondLst>
+                                        </p:cTn>
+                                        <p:tgtEl>
+                                          <p:spTgt spid="3">
+                                            <p:txEl>
+                                              <p:pRg st="7" end="7"/>
+                                            </p:txEl>
+                                          </p:spTgt>
+                                        </p:tgtEl>
+                                        <p:attrNameLst>
+                                          <p:attrName>style.visibility</p:attrName>
+                                        </p:attrNameLst>
+                                      </p:cBhvr>
+                                      <p:to>
+                                        <p:strVal val="visible"/>
+                                      </p:to>
+                                    </p:set>
+                                  </p:childTnLst>
+                                </p:cTn>
+                              </p:par>
+                              <p:par>
+                                <p:cTn id="31" presetID="1" presetClass="entr" presetSubtype="0" fill="hold" grpId="0" nodeType="withEffect">
+                                  <p:stCondLst>
+                                    <p:cond delay="0"/>
+                                  </p:stCondLst>
+                                  <p:childTnLst>
+                                    <p:set>
+                                      <p:cBhvr>
+                                        <p:cTn id="32" dur="1" fill="hold">
+                                          <p:stCondLst>
+                                            <p:cond delay="0"/>
+                                          </p:stCondLst>
+                                        </p:cTn>
+                                        <p:tgtEl>
+                                          <p:spTgt spid="3">
+                                            <p:txEl>
+                                              <p:pRg st="8" end="8"/>
+                                            </p:txEl>
+                                          </p:spTgt>
+                                        </p:tgtEl>
+                                        <p:attrNameLst>
+                                          <p:attrName>style.visibility</p:attrName>
+                                        </p:attrNameLst>
+                                      </p:cBhvr>
+                                      <p:to>
+                                        <p:strVal val="visible"/>
+                                      </p:to>
+                                    </p:set>
+                                  </p:childTnLst>
+                                </p:cTn>
+                              </p:par>
+                              <p:par>
+                                <p:cTn id="33" presetID="1" presetClass="entr" presetSubtype="0" fill="hold" grpId="0" nodeType="withEffect">
+                                  <p:stCondLst>
+                                    <p:cond delay="0"/>
+                                  </p:stCondLst>
+                                  <p:childTnLst>
+                                    <p:set>
+                                      <p:cBhvr>
+                                        <p:cTn id="34" dur="1" fill="hold">
+                                          <p:stCondLst>
+                                            <p:cond delay="0"/>
+                                          </p:stCondLst>
+                                        </p:cTn>
+                                        <p:tgtEl>
+                                          <p:spTgt spid="3">
+                                            <p:txEl>
+                                              <p:pRg st="9" end="9"/>
+                                            </p:txEl>
+                                          </p:spTgt>
+                                        </p:tgtEl>
+                                        <p:attrNameLst>
+                                          <p:attrName>style.visibility</p:attrName>
+                                        </p:attrNameLst>
+                                      </p:cBhvr>
+                                      <p:to>
+                                        <p:strVal val="visible"/>
+                                      </p:to>
+                                    </p:set>
+                                  </p:childTnLst>
+                                </p:cTn>
+                              </p:par>
+                            </p:childTnLst>
+                          </p:cTn>
+                        </p:par>
+                      </p:childTnLst>
+                    </p:cTn>
+                  </p:par>
+                  <p:par>
+                    <p:cTn id="35" fill="hold">
+                      <p:stCondLst>
+                        <p:cond delay="indefinite"/>
+                      </p:stCondLst>
+                      <p:childTnLst>
+                        <p:par>
+                          <p:cTn id="36" fill="hold">
+                            <p:stCondLst>
+                              <p:cond delay="0"/>
+                            </p:stCondLst>
+                            <p:childTnLst>
+                              <p:par>
+                                <p:cTn id="37" presetID="1" presetClass="entr" presetSubtype="0" fill="hold" grpId="0" nodeType="clickEffect">
+                                  <p:stCondLst>
+                                    <p:cond delay="0"/>
+                                  </p:stCondLst>
+                                  <p:childTnLst>
+                                    <p:set>
+                                      <p:cBhvr>
+                                        <p:cTn id="38" dur="1" fill="hold">
+                                          <p:stCondLst>
+                                            <p:cond delay="0"/>
+                                          </p:stCondLst>
+                                        </p:cTn>
+                                        <p:tgtEl>
+                                          <p:spTgt spid="3">
+                                            <p:txEl>
+                                              <p:pRg st="10" end="10"/>
+                                            </p:txEl>
+                                          </p:spTgt>
+                                        </p:tgtEl>
+                                        <p:attrNameLst>
+                                          <p:attrName>style.visibility</p:attrName>
+                                        </p:attrNameLst>
+                                      </p:cBhvr>
+                                      <p:to>
+                                        <p:strVal val="visible"/>
+                                      </p:to>
+                                    </p:set>
+                                  </p:childTnLst>
+                                </p:cTn>
+                              </p:par>
+                            </p:childTnLst>
+                          </p:cTn>
+                        </p:par>
+                      </p:childTnLst>
+                    </p:cTn>
+                  </p:par>
+                  <p:par>
+                    <p:cTn id="39" fill="hold">
+                      <p:stCondLst>
+                        <p:cond delay="indefinite"/>
+                      </p:stCondLst>
+                      <p:childTnLst>
+                        <p:par>
+                          <p:cTn id="40" fill="hold">
+                            <p:stCondLst>
+                              <p:cond delay="0"/>
+                            </p:stCondLst>
+                            <p:childTnLst>
+                              <p:par>
+                                <p:cTn id="41" presetID="1" presetClass="entr" presetSubtype="0" fill="hold" grpId="0" nodeType="clickEffect">
+                                  <p:stCondLst>
+                                    <p:cond delay="0"/>
+                                  </p:stCondLst>
+                                  <p:childTnLst>
+                                    <p:set>
+                                      <p:cBhvr>
+                                        <p:cTn id="42" dur="1" fill="hold">
+                                          <p:stCondLst>
+                                            <p:cond delay="0"/>
+                                          </p:stCondLst>
+                                        </p:cTn>
+                                        <p:tgtEl>
+                                          <p:spTgt spid="3">
+                                            <p:txEl>
+                                              <p:pRg st="11" end="11"/>
+                                            </p:txEl>
+                                          </p:spTgt>
+                                        </p:tgtEl>
+                                        <p:attrNameLst>
+                                          <p:attrName>style.visibility</p:attrName>
+                                        </p:attrNameLst>
+                                      </p:cBhvr>
+                                      <p:to>
+                                        <p:strVal val="visible"/>
+                                      </p:to>
+                                    </p:set>
+                                  </p:childTnLst>
+                                </p:cTn>
+                              </p:par>
+                            </p:childTnLst>
+                          </p:cTn>
+                        </p:par>
+                      </p:childTnLst>
+                    </p:cTn>
+                  </p:par>
+                </p:childTnLst>
+              </p:cTn>
+              <p:prevCondLst>
+                <p:cond evt="onPrev" delay="0">
+                  <p:tgtEl>
+                    <p:sldTgt/>
+                  </p:tgtEl>
+                </p:cond>
+              </p:prevCondLst>
+              <p:nextCondLst>
+                <p:cond evt="onNext" delay="0">
+                  <p:tgtEl>
+                    <p:sldTgt/>
+                  </p:tgtEl>
+                </p:cond>
+              </p:nextCondLst>
+            </p:seq>
+          </p:childTnLst>
+        </p:cTn>
+      </p:par>
+    </p:tnLst>
+    <p:bldLst>
+      <p:bldP spid="3" grpId="0" build="p"/>
+    </p:bldLst>
+  </p:timing>
 </p:sld>
 </file>
 

</xml_diff>